<commit_message>
correct ppt font bug
</commit_message>
<xml_diff>
--- a/Presentation/SE-System-Design-Presentation.pptx
+++ b/Presentation/SE-System-Design-Presentation.pptx
@@ -714,11 +714,7 @@
           <a:p>
             <a:r>
               <a:rPr lang="en-US" altLang="zh-CN" sz="3400" b="1" dirty="0" smtClean="0"/>
-              <a:t>Collaborato</a:t>
-            </a:r>
-            <a:r>
-              <a:rPr lang="en-US" altLang="zh-CN" sz="3400" b="1" dirty="0" smtClean="0"/>
-              <a:t>r</a:t>
+              <a:t>Collaborator</a:t>
             </a:r>
             <a:r>
               <a:rPr lang="zh-CN" altLang="en-US" sz="3400" b="1" dirty="0" smtClean="0"/>
@@ -938,13 +934,8 @@
             </a:r>
             <a:r>
               <a:rPr lang="zh-CN" altLang="en-US" dirty="0" smtClean="0"/>
-              <a:t>类实例；由于密码只在登录时用到，因此类内不包含密码属性（</a:t>
-            </a:r>
-            <a:r>
-              <a:rPr lang="zh-CN" altLang="en-US" dirty="0" smtClean="0"/>
-              <a:t>教师和管理员用户类似）</a:t>
-            </a:r>
-            <a:endParaRPr lang="zh-CN" altLang="en-US" dirty="0" smtClean="0"/>
+              <a:t>类实例；由于密码只在登录时用到，因此类内不包含密码属性（教师和管理员用户类似）</a:t>
+            </a:r>
           </a:p>
           <a:p>
             <a:endParaRPr kumimoji="1" lang="zh-CN" altLang="en-US" dirty="0"/>
@@ -7112,21 +7103,21 @@
         <p:spPr>
           <a:xfrm>
             <a:off x="771527" y="2660651"/>
-            <a:ext cx="6183977" cy="1234727"/>
+            <a:ext cx="7394573" cy="1234727"/>
           </a:xfrm>
         </p:spPr>
         <p:txBody>
           <a:bodyPr>
-            <a:normAutofit fontScale="90000"/>
+            <a:noAutofit/>
           </a:bodyPr>
           <a:lstStyle/>
           <a:p>
             <a:r>
-              <a:rPr kumimoji="1" lang="en-US" altLang="zh-CN" dirty="0" smtClean="0"/>
+              <a:rPr kumimoji="1" lang="en-US" altLang="zh-CN" sz="4800" dirty="0" smtClean="0"/>
               <a:t>System Design of </a:t>
             </a:r>
             <a:r>
-              <a:rPr kumimoji="1" lang="en-US" altLang="zh-CN" dirty="0" smtClean="0">
+              <a:rPr kumimoji="1" lang="en-US" altLang="zh-CN" sz="4800" dirty="0" smtClean="0">
                 <a:solidFill>
                   <a:schemeClr val="tx1"/>
                 </a:solidFill>
@@ -7134,17 +7125,17 @@
               <a:t>Black</a:t>
             </a:r>
             <a:r>
-              <a:rPr kumimoji="1" lang="en-US" altLang="zh-CN" dirty="0" smtClean="0"/>
+              <a:rPr kumimoji="1" lang="en-US" altLang="zh-CN" sz="4800" dirty="0" smtClean="0"/>
               <a:t>-1:</a:t>
             </a:r>
             <a:br>
-              <a:rPr kumimoji="1" lang="en-US" altLang="zh-CN" dirty="0" smtClean="0"/>
+              <a:rPr kumimoji="1" lang="en-US" altLang="zh-CN" sz="4800" dirty="0" smtClean="0"/>
             </a:br>
             <a:r>
-              <a:rPr kumimoji="1" lang="en-US" altLang="zh-CN" dirty="0" smtClean="0"/>
+              <a:rPr kumimoji="1" lang="en-US" altLang="zh-CN" sz="4800" dirty="0" smtClean="0"/>
               <a:t>Info-Management</a:t>
             </a:r>
-            <a:endParaRPr kumimoji="1" lang="zh-CN" altLang="en-US" dirty="0"/>
+            <a:endParaRPr kumimoji="1" lang="zh-CN" altLang="en-US" sz="4800" dirty="0"/>
           </a:p>
         </p:txBody>
       </p:sp>
@@ -7158,17 +7149,32 @@
             <p:ph type="subTitle" idx="1"/>
           </p:nvPr>
         </p:nvSpPr>
-        <p:spPr/>
-        <p:txBody>
-          <a:bodyPr/>
+        <p:spPr>
+          <a:xfrm>
+            <a:off x="771527" y="4330700"/>
+            <a:ext cx="7510506" cy="2219108"/>
+          </a:xfrm>
+        </p:spPr>
+        <p:txBody>
+          <a:bodyPr>
+            <a:normAutofit/>
+          </a:bodyPr>
           <a:lstStyle/>
           <a:p>
             <a:r>
-              <a:rPr kumimoji="1" lang="zh-CN" altLang="en-US" dirty="0" smtClean="0"/>
+              <a:rPr kumimoji="1" lang="zh-CN" altLang="en-US" sz="2800" b="1" dirty="0" smtClean="0">
+                <a:latin typeface="Songti SC Black" charset="-122"/>
+                <a:ea typeface="Songti SC Black" charset="-122"/>
+                <a:cs typeface="Songti SC Black" charset="-122"/>
+              </a:rPr>
               <a:t>董可扬，王儒，安磊，</a:t>
             </a:r>
             <a:r>
-              <a:rPr kumimoji="1" lang="zh-CN" altLang="en-US" dirty="0"/>
+              <a:rPr kumimoji="1" lang="zh-CN" altLang="en-US" sz="2800" b="1" dirty="0">
+                <a:latin typeface="Songti SC Black" charset="-122"/>
+                <a:ea typeface="Songti SC Black" charset="-122"/>
+                <a:cs typeface="Songti SC Black" charset="-122"/>
+              </a:rPr>
               <a:t>徐雨豪，秦昇</a:t>
             </a:r>
           </a:p>
@@ -10031,11 +10037,6 @@
               </a:rPr>
               <a:t>Responsibility</a:t>
             </a:r>
-            <a:endParaRPr lang="en-US" altLang="zh-CN" sz="2550" b="1" dirty="0">
-              <a:latin typeface="Microsoft YaHei" charset="0"/>
-              <a:ea typeface="Microsoft YaHei" charset="0"/>
-              <a:cs typeface="Microsoft YaHei" charset="0"/>
-            </a:endParaRPr>
           </a:p>
           <a:p>
             <a:pPr lvl="1"/>
@@ -10126,21 +10127,8 @@
                 <a:ea typeface="Microsoft YaHei" charset="0"/>
                 <a:cs typeface="Microsoft YaHei" charset="0"/>
               </a:rPr>
-              <a:t>验证失败后请用户重新输入，超过一定次数则拒绝继续</a:t>
-            </a:r>
-            <a:r>
-              <a:rPr lang="zh-CN" altLang="en-US" sz="2550" dirty="0">
-                <a:latin typeface="Microsoft YaHei" charset="0"/>
-                <a:ea typeface="Microsoft YaHei" charset="0"/>
-                <a:cs typeface="Microsoft YaHei" charset="0"/>
-              </a:rPr>
-              <a:t>尝试</a:t>
-            </a:r>
-            <a:endParaRPr lang="zh-CN" altLang="en-US" sz="2550" dirty="0">
-              <a:latin typeface="Microsoft YaHei" charset="0"/>
-              <a:ea typeface="Microsoft YaHei" charset="0"/>
-              <a:cs typeface="Microsoft YaHei" charset="0"/>
-            </a:endParaRPr>
+              <a:t>验证失败后请用户重新输入，超过一定次数则拒绝继续尝试</a:t>
+            </a:r>
           </a:p>
         </p:txBody>
       </p:sp>

</xml_diff>